<commit_message>
gerenciar produtos - comprar produtos
</commit_message>
<xml_diff>
--- a/docs/ARTEFATOS(15-23)/Arquitetura_Negócio/15) Arquitetura de Negócio para cada Cenário.pptx
+++ b/docs/ARTEFATOS(15-23)/Arquitetura_Negócio/15) Arquitetura de Negócio para cada Cenário.pptx
@@ -10,6 +10,7 @@
     <p:sldId id="257" r:id="rId5"/>
     <p:sldId id="258" r:id="rId6"/>
     <p:sldId id="259" r:id="rId7"/>
+    <p:sldId id="260" r:id="rId8"/>
   </p:sldIdLst>
   <p:sldSz cx="10080625" cy="5670550"/>
   <p:notesSz cx="7559675" cy="10691812"/>
@@ -3274,7 +3275,7 @@
         <p:spPr>
           <a:xfrm>
             <a:off x="4033800" y="204840"/>
-            <a:ext cx="1995480" cy="845280"/>
+            <a:ext cx="1995120" cy="844920"/>
           </a:xfrm>
           <a:prstGeom prst="wave">
             <a:avLst>
@@ -3333,7 +3334,7 @@
         <p:spPr>
           <a:xfrm>
             <a:off x="2654280" y="2880000"/>
-            <a:ext cx="1374120" cy="580680"/>
+            <a:ext cx="1373760" cy="580320"/>
           </a:xfrm>
           <a:prstGeom prst="roundRect">
             <a:avLst>
@@ -3401,9 +3402,9 @@
         <p:grpSpPr>
           <a:xfrm>
             <a:off x="27360" y="2736000"/>
-            <a:ext cx="1120320" cy="910080"/>
+            <a:ext cx="1119960" cy="909720"/>
             <a:chOff x="27360" y="2736000"/>
-            <a:chExt cx="1120320" cy="910080"/>
+            <a:chExt cx="1119960" cy="909720"/>
           </a:xfrm>
         </p:grpSpPr>
         <p:grpSp>
@@ -3414,10 +3415,10 @@
           </p:nvGrpSpPr>
           <p:grpSpPr>
             <a:xfrm>
-              <a:off x="412200" y="2736000"/>
-              <a:ext cx="346320" cy="648000"/>
-              <a:chOff x="412200" y="2736000"/>
-              <a:chExt cx="346320" cy="648000"/>
+              <a:off x="411840" y="2736000"/>
+              <a:ext cx="346680" cy="648000"/>
+              <a:chOff x="411840" y="2736000"/>
+              <a:chExt cx="346680" cy="648000"/>
             </a:xfrm>
           </p:grpSpPr>
           <p:sp>
@@ -3429,7 +3430,7 @@
             <p:spPr>
               <a:xfrm>
                 <a:off x="484920" y="2736000"/>
-                <a:ext cx="208800" cy="210960"/>
+                <a:ext cx="208440" cy="210600"/>
               </a:xfrm>
               <a:prstGeom prst="flowChartConnector">
                 <a:avLst/>
@@ -3459,8 +3460,8 @@
             </p:nvSpPr>
             <p:spPr>
               <a:xfrm flipH="1">
-                <a:off x="580680" y="2952000"/>
-                <a:ext cx="360" cy="219600"/>
+                <a:off x="579960" y="2952000"/>
+                <a:ext cx="360" cy="219240"/>
               </a:xfrm>
               <a:custGeom>
                 <a:avLst/>
@@ -3502,7 +3503,7 @@
             <p:spPr>
               <a:xfrm>
                 <a:off x="437040" y="3049200"/>
-                <a:ext cx="304920" cy="360"/>
+                <a:ext cx="304560" cy="360"/>
               </a:xfrm>
               <a:custGeom>
                 <a:avLst/>
@@ -3544,7 +3545,7 @@
             <p:spPr>
               <a:xfrm flipH="1">
                 <a:off x="411840" y="3175560"/>
-                <a:ext cx="164520" cy="202680"/>
+                <a:ext cx="164160" cy="202320"/>
               </a:xfrm>
               <a:custGeom>
                 <a:avLst/>
@@ -3585,8 +3586,8 @@
             </p:nvSpPr>
             <p:spPr>
               <a:xfrm rot="10800000">
-                <a:off x="593640" y="3181320"/>
-                <a:ext cx="164880" cy="202680"/>
+                <a:off x="594000" y="3181680"/>
+                <a:ext cx="164520" cy="202320"/>
               </a:xfrm>
               <a:custGeom>
                 <a:avLst/>
@@ -3629,7 +3630,7 @@
           <p:spPr>
             <a:xfrm>
               <a:off x="27360" y="3273480"/>
-              <a:ext cx="1120320" cy="372600"/>
+              <a:ext cx="1119960" cy="372240"/>
             </a:xfrm>
             <a:prstGeom prst="rect">
               <a:avLst/>
@@ -3681,7 +3682,7 @@
         <p:spPr>
           <a:xfrm>
             <a:off x="2417040" y="1584000"/>
-            <a:ext cx="3339360" cy="1227960"/>
+            <a:ext cx="3339000" cy="1227600"/>
           </a:xfrm>
           <a:prstGeom prst="rect">
             <a:avLst/>
@@ -3702,7 +3703,7 @@
             <a:noAutofit/>
           </a:bodyPr>
           <a:p>
-            <a:pPr marL="457200" indent="-293040">
+            <a:pPr marL="457200" indent="-292680">
               <a:lnSpc>
                 <a:spcPct val="100000"/>
               </a:lnSpc>
@@ -3757,7 +3758,7 @@
         <p:spPr>
           <a:xfrm>
             <a:off x="2488320" y="4104000"/>
-            <a:ext cx="3339360" cy="910080"/>
+            <a:ext cx="3339000" cy="909720"/>
           </a:xfrm>
           <a:prstGeom prst="rect">
             <a:avLst/>
@@ -3778,7 +3779,7 @@
             <a:noAutofit/>
           </a:bodyPr>
           <a:p>
-            <a:pPr marL="457200" indent="-293040">
+            <a:pPr marL="457200" indent="-292680">
               <a:lnSpc>
                 <a:spcPct val="100000"/>
               </a:lnSpc>
@@ -3833,7 +3834,7 @@
         <p:spPr>
           <a:xfrm>
             <a:off x="8735760" y="5061600"/>
-            <a:ext cx="1272600" cy="518760"/>
+            <a:ext cx="1272240" cy="518400"/>
           </a:xfrm>
           <a:prstGeom prst="rect">
             <a:avLst/>
@@ -3874,7 +3875,7 @@
             </a:endParaRPr>
           </a:p>
           <a:p>
-            <a:pPr marL="457200" indent="-286560">
+            <a:pPr marL="457200" indent="-286200">
               <a:lnSpc>
                 <a:spcPct val="100000"/>
               </a:lnSpc>
@@ -3909,9 +3910,9 @@
         <p:grpSpPr>
           <a:xfrm>
             <a:off x="466920" y="1008000"/>
-            <a:ext cx="1472760" cy="901800"/>
+            <a:ext cx="1472400" cy="901440"/>
             <a:chOff x="466920" y="1008000"/>
-            <a:chExt cx="1472760" cy="901800"/>
+            <a:chExt cx="1472400" cy="901440"/>
           </a:xfrm>
         </p:grpSpPr>
         <p:grpSp>
@@ -3922,10 +3923,10 @@
           </p:nvGrpSpPr>
           <p:grpSpPr>
             <a:xfrm>
-              <a:off x="1013760" y="1008000"/>
-              <a:ext cx="306720" cy="642240"/>
-              <a:chOff x="1013760" y="1008000"/>
-              <a:chExt cx="306720" cy="642240"/>
+              <a:off x="1013400" y="1008000"/>
+              <a:ext cx="307080" cy="642240"/>
+              <a:chOff x="1013400" y="1008000"/>
+              <a:chExt cx="307080" cy="642240"/>
             </a:xfrm>
           </p:grpSpPr>
           <p:sp>
@@ -3937,7 +3938,7 @@
             <p:spPr>
               <a:xfrm>
                 <a:off x="1078560" y="1008000"/>
-                <a:ext cx="184320" cy="208800"/>
+                <a:ext cx="183960" cy="208440"/>
               </a:xfrm>
               <a:prstGeom prst="flowChartConnector">
                 <a:avLst/>
@@ -3967,8 +3968,8 @@
             </p:nvSpPr>
             <p:spPr>
               <a:xfrm flipH="1">
-                <a:off x="1162080" y="1222560"/>
-                <a:ext cx="360" cy="217440"/>
+                <a:off x="1161360" y="1222560"/>
+                <a:ext cx="360" cy="217080"/>
               </a:xfrm>
               <a:custGeom>
                 <a:avLst/>
@@ -4010,7 +4011,7 @@
             <p:spPr>
               <a:xfrm>
                 <a:off x="1036080" y="1318320"/>
-                <a:ext cx="270000" cy="360"/>
+                <a:ext cx="269640" cy="360"/>
               </a:xfrm>
               <a:custGeom>
                 <a:avLst/>
@@ -4051,8 +4052,8 @@
             </p:nvSpPr>
             <p:spPr>
               <a:xfrm flipH="1">
-                <a:off x="1013760" y="1443960"/>
-                <a:ext cx="145440" cy="200880"/>
+                <a:off x="1013040" y="1443960"/>
+                <a:ext cx="145080" cy="200520"/>
               </a:xfrm>
               <a:custGeom>
                 <a:avLst/>
@@ -4093,8 +4094,8 @@
             </p:nvSpPr>
             <p:spPr>
               <a:xfrm rot="10800000">
-                <a:off x="1175400" y="1449360"/>
-                <a:ext cx="145080" cy="200880"/>
+                <a:off x="1175760" y="1449720"/>
+                <a:ext cx="144720" cy="200520"/>
               </a:xfrm>
               <a:custGeom>
                 <a:avLst/>
@@ -4137,7 +4138,7 @@
           <p:spPr>
             <a:xfrm>
               <a:off x="466920" y="1540800"/>
-              <a:ext cx="1472760" cy="369000"/>
+              <a:ext cx="1472400" cy="368640"/>
             </a:xfrm>
             <a:prstGeom prst="rect">
               <a:avLst/>
@@ -4189,7 +4190,7 @@
         <p:spPr>
           <a:xfrm>
             <a:off x="675360" y="2722680"/>
-            <a:ext cx="3339360" cy="910080"/>
+            <a:ext cx="3339000" cy="909720"/>
           </a:xfrm>
           <a:prstGeom prst="rect">
             <a:avLst/>
@@ -4210,7 +4211,7 @@
             <a:noAutofit/>
           </a:bodyPr>
           <a:p>
-            <a:pPr marL="457200" indent="-293040">
+            <a:pPr marL="457200" indent="-292680">
               <a:lnSpc>
                 <a:spcPct val="100000"/>
               </a:lnSpc>
@@ -4265,9 +4266,9 @@
         <p:grpSpPr>
           <a:xfrm>
             <a:off x="675360" y="4176000"/>
-            <a:ext cx="1120320" cy="910080"/>
+            <a:ext cx="1119960" cy="909720"/>
             <a:chOff x="675360" y="4176000"/>
-            <a:chExt cx="1120320" cy="910080"/>
+            <a:chExt cx="1119960" cy="909720"/>
           </a:xfrm>
         </p:grpSpPr>
         <p:grpSp>
@@ -4278,10 +4279,10 @@
           </p:nvGrpSpPr>
           <p:grpSpPr>
             <a:xfrm>
-              <a:off x="1060200" y="4176000"/>
-              <a:ext cx="346320" cy="648000"/>
-              <a:chOff x="1060200" y="4176000"/>
-              <a:chExt cx="346320" cy="648000"/>
+              <a:off x="1059840" y="4176000"/>
+              <a:ext cx="346680" cy="648000"/>
+              <a:chOff x="1059840" y="4176000"/>
+              <a:chExt cx="346680" cy="648000"/>
             </a:xfrm>
           </p:grpSpPr>
           <p:sp>
@@ -4293,7 +4294,7 @@
             <p:spPr>
               <a:xfrm>
                 <a:off x="1132920" y="4176000"/>
-                <a:ext cx="208800" cy="210960"/>
+                <a:ext cx="208440" cy="210600"/>
               </a:xfrm>
               <a:prstGeom prst="flowChartConnector">
                 <a:avLst/>
@@ -4323,8 +4324,8 @@
             </p:nvSpPr>
             <p:spPr>
               <a:xfrm flipH="1">
-                <a:off x="1228680" y="4392000"/>
-                <a:ext cx="360" cy="219600"/>
+                <a:off x="1227960" y="4392000"/>
+                <a:ext cx="360" cy="219240"/>
               </a:xfrm>
               <a:custGeom>
                 <a:avLst/>
@@ -4366,7 +4367,7 @@
             <p:spPr>
               <a:xfrm>
                 <a:off x="1085040" y="4489200"/>
-                <a:ext cx="304920" cy="360"/>
+                <a:ext cx="304560" cy="360"/>
               </a:xfrm>
               <a:custGeom>
                 <a:avLst/>
@@ -4408,7 +4409,7 @@
             <p:spPr>
               <a:xfrm flipH="1">
                 <a:off x="1059840" y="4615560"/>
-                <a:ext cx="164520" cy="202680"/>
+                <a:ext cx="164160" cy="202320"/>
               </a:xfrm>
               <a:custGeom>
                 <a:avLst/>
@@ -4449,8 +4450,8 @@
             </p:nvSpPr>
             <p:spPr>
               <a:xfrm rot="10800000">
-                <a:off x="1241640" y="4621320"/>
-                <a:ext cx="164880" cy="202680"/>
+                <a:off x="1242000" y="4621680"/>
+                <a:ext cx="164520" cy="202320"/>
               </a:xfrm>
               <a:custGeom>
                 <a:avLst/>
@@ -4493,7 +4494,7 @@
           <p:spPr>
             <a:xfrm>
               <a:off x="675360" y="4713480"/>
-              <a:ext cx="1120320" cy="372600"/>
+              <a:ext cx="1119960" cy="372240"/>
             </a:xfrm>
             <a:prstGeom prst="rect">
               <a:avLst/>
@@ -4545,7 +4546,7 @@
         <p:spPr>
           <a:xfrm>
             <a:off x="1943280" y="1460520"/>
-            <a:ext cx="1396440" cy="1416240"/>
+            <a:ext cx="1396080" cy="1415880"/>
           </a:xfrm>
           <a:custGeom>
             <a:avLst/>
@@ -4586,8 +4587,8 @@
         </p:nvSpPr>
         <p:spPr>
           <a:xfrm flipH="1" rot="10800000">
-            <a:off x="1797120" y="3463560"/>
-            <a:ext cx="1540440" cy="1165320"/>
+            <a:off x="1797120" y="3463920"/>
+            <a:ext cx="1540080" cy="1164960"/>
           </a:xfrm>
           <a:custGeom>
             <a:avLst/>
@@ -4628,8 +4629,8 @@
         </p:nvSpPr>
         <p:spPr>
           <a:xfrm flipH="1" rot="10800000">
-            <a:off x="1151280" y="3171240"/>
-            <a:ext cx="1499760" cy="17640"/>
+            <a:off x="1150920" y="3171600"/>
+            <a:ext cx="1499400" cy="17280"/>
           </a:xfrm>
           <a:custGeom>
             <a:avLst/>
@@ -4671,9 +4672,9 @@
         <p:grpSpPr>
           <a:xfrm>
             <a:off x="5039640" y="2624400"/>
-            <a:ext cx="1856880" cy="901800"/>
+            <a:ext cx="1856520" cy="901440"/>
             <a:chOff x="5039640" y="2624400"/>
-            <a:chExt cx="1856880" cy="901800"/>
+            <a:chExt cx="1856520" cy="901440"/>
           </a:xfrm>
         </p:grpSpPr>
         <p:grpSp>
@@ -4684,10 +4685,10 @@
           </p:nvGrpSpPr>
           <p:grpSpPr>
             <a:xfrm>
-              <a:off x="5586480" y="2624400"/>
-              <a:ext cx="306720" cy="642240"/>
-              <a:chOff x="5586480" y="2624400"/>
-              <a:chExt cx="306720" cy="642240"/>
+              <a:off x="5586120" y="2624400"/>
+              <a:ext cx="307080" cy="642240"/>
+              <a:chOff x="5586120" y="2624400"/>
+              <a:chExt cx="307080" cy="642240"/>
             </a:xfrm>
           </p:grpSpPr>
           <p:sp>
@@ -4699,7 +4700,7 @@
             <p:spPr>
               <a:xfrm>
                 <a:off x="5651280" y="2624400"/>
-                <a:ext cx="184320" cy="208800"/>
+                <a:ext cx="183960" cy="208440"/>
               </a:xfrm>
               <a:prstGeom prst="flowChartConnector">
                 <a:avLst/>
@@ -4729,8 +4730,8 @@
             </p:nvSpPr>
             <p:spPr>
               <a:xfrm flipH="1">
-                <a:off x="5734800" y="2838960"/>
-                <a:ext cx="360" cy="217440"/>
+                <a:off x="5734080" y="2838960"/>
+                <a:ext cx="360" cy="217080"/>
               </a:xfrm>
               <a:custGeom>
                 <a:avLst/>
@@ -4772,7 +4773,7 @@
             <p:spPr>
               <a:xfrm>
                 <a:off x="5608800" y="2934720"/>
-                <a:ext cx="270000" cy="360"/>
+                <a:ext cx="269640" cy="360"/>
               </a:xfrm>
               <a:custGeom>
                 <a:avLst/>
@@ -4813,8 +4814,8 @@
             </p:nvSpPr>
             <p:spPr>
               <a:xfrm flipH="1">
-                <a:off x="5586480" y="3060360"/>
-                <a:ext cx="145440" cy="200880"/>
+                <a:off x="5585760" y="3060360"/>
+                <a:ext cx="145080" cy="200520"/>
               </a:xfrm>
               <a:custGeom>
                 <a:avLst/>
@@ -4855,8 +4856,8 @@
             </p:nvSpPr>
             <p:spPr>
               <a:xfrm rot="10800000">
-                <a:off x="5748120" y="3065760"/>
-                <a:ext cx="145080" cy="200880"/>
+                <a:off x="5748480" y="3066120"/>
+                <a:ext cx="144720" cy="200520"/>
               </a:xfrm>
               <a:custGeom>
                 <a:avLst/>
@@ -4899,7 +4900,7 @@
           <p:spPr>
             <a:xfrm>
               <a:off x="5039640" y="3157200"/>
-              <a:ext cx="1856880" cy="369000"/>
+              <a:ext cx="1856520" cy="368640"/>
             </a:xfrm>
             <a:prstGeom prst="rect">
               <a:avLst/>
@@ -4950,8 +4951,8 @@
         </p:nvSpPr>
         <p:spPr>
           <a:xfrm flipH="1" rot="10800000">
-            <a:off x="4046760" y="3171240"/>
-            <a:ext cx="1499760" cy="17640"/>
+            <a:off x="4046400" y="3171600"/>
+            <a:ext cx="1499400" cy="17280"/>
           </a:xfrm>
           <a:custGeom>
             <a:avLst/>
@@ -5023,7 +5024,7 @@
         <p:spPr>
           <a:xfrm>
             <a:off x="143280" y="1593360"/>
-            <a:ext cx="9411480" cy="1501920"/>
+            <a:ext cx="9411120" cy="1501560"/>
           </a:xfrm>
           <a:prstGeom prst="rect">
             <a:avLst/>
@@ -5077,7 +5078,7 @@
         <p:spPr>
           <a:xfrm>
             <a:off x="4033800" y="204840"/>
-            <a:ext cx="1995480" cy="845280"/>
+            <a:ext cx="1995120" cy="844920"/>
           </a:xfrm>
           <a:prstGeom prst="wave">
             <a:avLst>
@@ -5106,7 +5107,7 @@
             <a:noAutofit/>
           </a:bodyPr>
           <a:p>
-            <a:pPr marL="457200" indent="-286560">
+            <a:pPr marL="457200" indent="-286200">
               <a:lnSpc>
                 <a:spcPct val="100000"/>
               </a:lnSpc>
@@ -5141,9 +5142,9 @@
         <p:grpSpPr>
           <a:xfrm>
             <a:off x="1637280" y="2081520"/>
-            <a:ext cx="1120320" cy="910440"/>
+            <a:ext cx="1119960" cy="910080"/>
             <a:chOff x="1637280" y="2081520"/>
-            <a:chExt cx="1120320" cy="910440"/>
+            <a:chExt cx="1119960" cy="910080"/>
           </a:xfrm>
         </p:grpSpPr>
         <p:grpSp>
@@ -5154,10 +5155,10 @@
           </p:nvGrpSpPr>
           <p:grpSpPr>
             <a:xfrm>
-              <a:off x="2022120" y="2081520"/>
-              <a:ext cx="346320" cy="648000"/>
-              <a:chOff x="2022120" y="2081520"/>
-              <a:chExt cx="346320" cy="648000"/>
+              <a:off x="2021760" y="2081520"/>
+              <a:ext cx="346680" cy="648000"/>
+              <a:chOff x="2021760" y="2081520"/>
+              <a:chExt cx="346680" cy="648000"/>
             </a:xfrm>
           </p:grpSpPr>
           <p:sp>
@@ -5169,7 +5170,7 @@
             <p:spPr>
               <a:xfrm>
                 <a:off x="2094840" y="2081520"/>
-                <a:ext cx="208800" cy="210960"/>
+                <a:ext cx="208440" cy="210600"/>
               </a:xfrm>
               <a:prstGeom prst="flowChartConnector">
                 <a:avLst/>
@@ -5199,8 +5200,8 @@
             </p:nvSpPr>
             <p:spPr>
               <a:xfrm flipH="1">
-                <a:off x="2190600" y="2297880"/>
-                <a:ext cx="360" cy="219600"/>
+                <a:off x="2189880" y="2297880"/>
+                <a:ext cx="360" cy="219240"/>
               </a:xfrm>
               <a:custGeom>
                 <a:avLst/>
@@ -5242,7 +5243,7 @@
             <p:spPr>
               <a:xfrm>
                 <a:off x="2046960" y="2395080"/>
-                <a:ext cx="304920" cy="360"/>
+                <a:ext cx="304560" cy="360"/>
               </a:xfrm>
               <a:custGeom>
                 <a:avLst/>
@@ -5284,7 +5285,7 @@
             <p:spPr>
               <a:xfrm flipH="1">
                 <a:off x="2021760" y="2521440"/>
-                <a:ext cx="164520" cy="202680"/>
+                <a:ext cx="164160" cy="202320"/>
               </a:xfrm>
               <a:custGeom>
                 <a:avLst/>
@@ -5325,8 +5326,8 @@
             </p:nvSpPr>
             <p:spPr>
               <a:xfrm rot="10800000">
-                <a:off x="2203560" y="2526840"/>
-                <a:ext cx="164880" cy="202680"/>
+                <a:off x="2203920" y="2527200"/>
+                <a:ext cx="164520" cy="202320"/>
               </a:xfrm>
               <a:custGeom>
                 <a:avLst/>
@@ -5369,7 +5370,7 @@
           <p:spPr>
             <a:xfrm>
               <a:off x="1637280" y="2619360"/>
-              <a:ext cx="1120320" cy="372600"/>
+              <a:ext cx="1119960" cy="372240"/>
             </a:xfrm>
             <a:prstGeom prst="rect">
               <a:avLst/>
@@ -5421,7 +5422,7 @@
         <p:spPr>
           <a:xfrm>
             <a:off x="143280" y="3097440"/>
-            <a:ext cx="9411480" cy="1501920"/>
+            <a:ext cx="9411120" cy="1501560"/>
           </a:xfrm>
           <a:prstGeom prst="rect">
             <a:avLst/>
@@ -5475,7 +5476,7 @@
         <p:spPr>
           <a:xfrm>
             <a:off x="3366360" y="3744720"/>
-            <a:ext cx="1599840" cy="644400"/>
+            <a:ext cx="1599480" cy="644040"/>
           </a:xfrm>
           <a:prstGeom prst="bracketPair">
             <a:avLst>
@@ -5501,7 +5502,7 @@
             <a:noAutofit/>
           </a:bodyPr>
           <a:p>
-            <a:pPr marL="457200" indent="-286560">
+            <a:pPr marL="457200" indent="-286200">
               <a:lnSpc>
                 <a:spcPct val="100000"/>
               </a:lnSpc>
@@ -5526,7 +5527,7 @@
             </a:endParaRPr>
           </a:p>
           <a:p>
-            <a:pPr marL="457200" indent="-286560">
+            <a:pPr marL="457200" indent="-286200">
               <a:lnSpc>
                 <a:spcPct val="100000"/>
               </a:lnSpc>
@@ -5561,7 +5562,7 @@
         <p:spPr>
           <a:xfrm>
             <a:off x="3929040" y="2026800"/>
-            <a:ext cx="1099800" cy="580680"/>
+            <a:ext cx="1099440" cy="580320"/>
           </a:xfrm>
           <a:prstGeom prst="roundRect">
             <a:avLst>
@@ -5629,7 +5630,7 @@
         <p:spPr>
           <a:xfrm>
             <a:off x="5298480" y="2027880"/>
-            <a:ext cx="1099800" cy="580680"/>
+            <a:ext cx="1099440" cy="580320"/>
           </a:xfrm>
           <a:prstGeom prst="roundRect">
             <a:avLst>
@@ -5697,7 +5698,7 @@
         <p:spPr>
           <a:xfrm>
             <a:off x="5256000" y="1008000"/>
-            <a:ext cx="501840" cy="1017720"/>
+            <a:ext cx="501480" cy="1017360"/>
           </a:xfrm>
           <a:custGeom>
             <a:avLst/>
@@ -5738,8 +5739,8 @@
         </p:nvSpPr>
         <p:spPr>
           <a:xfrm flipH="1">
-            <a:off x="2301840" y="936000"/>
-            <a:ext cx="2085840" cy="1149840"/>
+            <a:off x="2301120" y="936000"/>
+            <a:ext cx="2085480" cy="1149480"/>
           </a:xfrm>
           <a:custGeom>
             <a:avLst/>
@@ -5781,7 +5782,7 @@
         <p:spPr>
           <a:xfrm flipH="1">
             <a:off x="4533840" y="936000"/>
-            <a:ext cx="286200" cy="1088640"/>
+            <a:ext cx="285840" cy="1088280"/>
           </a:xfrm>
           <a:custGeom>
             <a:avLst/>
@@ -5823,7 +5824,7 @@
         <p:spPr>
           <a:xfrm>
             <a:off x="5112000" y="3888000"/>
-            <a:ext cx="1222200" cy="242280"/>
+            <a:ext cx="1221840" cy="241920"/>
           </a:xfrm>
           <a:prstGeom prst="bracketPair">
             <a:avLst>
@@ -5849,7 +5850,7 @@
             <a:noAutofit/>
           </a:bodyPr>
           <a:p>
-            <a:pPr marL="457200" indent="-286560">
+            <a:pPr marL="457200" indent="-286200">
               <a:lnSpc>
                 <a:spcPct val="100000"/>
               </a:lnSpc>
@@ -5884,7 +5885,7 @@
         <p:spPr>
           <a:xfrm>
             <a:off x="5904000" y="2612160"/>
-            <a:ext cx="360" cy="1274040"/>
+            <a:ext cx="360" cy="1273680"/>
           </a:xfrm>
           <a:custGeom>
             <a:avLst/>
@@ -5925,8 +5926,8 @@
         </p:nvSpPr>
         <p:spPr>
           <a:xfrm rot="10800000">
-            <a:off x="4487400" y="2611440"/>
-            <a:ext cx="360" cy="1131480"/>
+            <a:off x="4487400" y="2611800"/>
+            <a:ext cx="360" cy="1131120"/>
           </a:xfrm>
           <a:custGeom>
             <a:avLst/>
@@ -5968,7 +5969,7 @@
         <p:spPr>
           <a:xfrm>
             <a:off x="6492600" y="3744720"/>
-            <a:ext cx="1497600" cy="580680"/>
+            <a:ext cx="1497240" cy="580320"/>
           </a:xfrm>
           <a:prstGeom prst="bracketPair">
             <a:avLst>
@@ -5994,7 +5995,7 @@
             <a:noAutofit/>
           </a:bodyPr>
           <a:p>
-            <a:pPr marL="457200" indent="-289800">
+            <a:pPr marL="457200" indent="-289440">
               <a:lnSpc>
                 <a:spcPct val="100000"/>
               </a:lnSpc>
@@ -6019,7 +6020,7 @@
             </a:endParaRPr>
           </a:p>
           <a:p>
-            <a:pPr marL="457200" indent="-289800">
+            <a:pPr marL="457200" indent="-289440">
               <a:lnSpc>
                 <a:spcPct val="100000"/>
               </a:lnSpc>
@@ -6054,7 +6055,7 @@
         <p:spPr>
           <a:xfrm>
             <a:off x="6696000" y="2027520"/>
-            <a:ext cx="1099800" cy="580680"/>
+            <a:ext cx="1099440" cy="580320"/>
           </a:xfrm>
           <a:prstGeom prst="roundRect">
             <a:avLst>
@@ -6122,7 +6123,7 @@
         <p:spPr>
           <a:xfrm>
             <a:off x="5544000" y="1058760"/>
-            <a:ext cx="1726200" cy="966960"/>
+            <a:ext cx="1725840" cy="966600"/>
           </a:xfrm>
           <a:custGeom>
             <a:avLst/>
@@ -6164,7 +6165,7 @@
         <p:spPr>
           <a:xfrm>
             <a:off x="7344000" y="2612160"/>
-            <a:ext cx="360" cy="1130760"/>
+            <a:ext cx="360" cy="1130400"/>
           </a:xfrm>
           <a:custGeom>
             <a:avLst/>
@@ -6236,7 +6237,7 @@
         <p:spPr>
           <a:xfrm>
             <a:off x="143280" y="1593360"/>
-            <a:ext cx="9411480" cy="1501920"/>
+            <a:ext cx="9411120" cy="1501560"/>
           </a:xfrm>
           <a:prstGeom prst="rect">
             <a:avLst/>
@@ -6290,7 +6291,7 @@
         <p:spPr>
           <a:xfrm>
             <a:off x="4033800" y="204840"/>
-            <a:ext cx="1995480" cy="845280"/>
+            <a:ext cx="1995120" cy="844920"/>
           </a:xfrm>
           <a:prstGeom prst="wave">
             <a:avLst>
@@ -6319,7 +6320,7 @@
             <a:noAutofit/>
           </a:bodyPr>
           <a:p>
-            <a:pPr marL="457200" indent="-286560">
+            <a:pPr marL="457200" indent="-286200">
               <a:lnSpc>
                 <a:spcPct val="100000"/>
               </a:lnSpc>
@@ -6354,9 +6355,9 @@
         <p:grpSpPr>
           <a:xfrm>
             <a:off x="1637280" y="2081520"/>
-            <a:ext cx="1120320" cy="910440"/>
+            <a:ext cx="1119960" cy="910080"/>
             <a:chOff x="1637280" y="2081520"/>
-            <a:chExt cx="1120320" cy="910440"/>
+            <a:chExt cx="1119960" cy="910080"/>
           </a:xfrm>
         </p:grpSpPr>
         <p:grpSp>
@@ -6367,10 +6368,10 @@
           </p:nvGrpSpPr>
           <p:grpSpPr>
             <a:xfrm>
-              <a:off x="2022120" y="2081520"/>
-              <a:ext cx="346320" cy="648000"/>
-              <a:chOff x="2022120" y="2081520"/>
-              <a:chExt cx="346320" cy="648000"/>
+              <a:off x="2021760" y="2081520"/>
+              <a:ext cx="346680" cy="648000"/>
+              <a:chOff x="2021760" y="2081520"/>
+              <a:chExt cx="346680" cy="648000"/>
             </a:xfrm>
           </p:grpSpPr>
           <p:sp>
@@ -6382,7 +6383,7 @@
             <p:spPr>
               <a:xfrm>
                 <a:off x="2094840" y="2081520"/>
-                <a:ext cx="208800" cy="210960"/>
+                <a:ext cx="208440" cy="210600"/>
               </a:xfrm>
               <a:prstGeom prst="flowChartConnector">
                 <a:avLst/>
@@ -6412,8 +6413,8 @@
             </p:nvSpPr>
             <p:spPr>
               <a:xfrm flipH="1">
-                <a:off x="2190600" y="2297880"/>
-                <a:ext cx="360" cy="219600"/>
+                <a:off x="2189880" y="2297880"/>
+                <a:ext cx="360" cy="219240"/>
               </a:xfrm>
               <a:custGeom>
                 <a:avLst/>
@@ -6455,7 +6456,7 @@
             <p:spPr>
               <a:xfrm>
                 <a:off x="2046960" y="2395080"/>
-                <a:ext cx="304920" cy="360"/>
+                <a:ext cx="304560" cy="360"/>
               </a:xfrm>
               <a:custGeom>
                 <a:avLst/>
@@ -6497,7 +6498,7 @@
             <p:spPr>
               <a:xfrm flipH="1">
                 <a:off x="2021760" y="2521440"/>
-                <a:ext cx="164520" cy="202680"/>
+                <a:ext cx="164160" cy="202320"/>
               </a:xfrm>
               <a:custGeom>
                 <a:avLst/>
@@ -6538,8 +6539,8 @@
             </p:nvSpPr>
             <p:spPr>
               <a:xfrm rot="10800000">
-                <a:off x="2203560" y="2526840"/>
-                <a:ext cx="164880" cy="202680"/>
+                <a:off x="2203920" y="2527200"/>
+                <a:ext cx="164520" cy="202320"/>
               </a:xfrm>
               <a:custGeom>
                 <a:avLst/>
@@ -6582,7 +6583,7 @@
           <p:spPr>
             <a:xfrm>
               <a:off x="1637280" y="2619360"/>
-              <a:ext cx="1120320" cy="372600"/>
+              <a:ext cx="1119960" cy="372240"/>
             </a:xfrm>
             <a:prstGeom prst="rect">
               <a:avLst/>
@@ -6634,7 +6635,7 @@
         <p:spPr>
           <a:xfrm>
             <a:off x="143280" y="3100680"/>
-            <a:ext cx="9411480" cy="1501920"/>
+            <a:ext cx="9411120" cy="1501560"/>
           </a:xfrm>
           <a:prstGeom prst="rect">
             <a:avLst/>
@@ -6688,7 +6689,7 @@
         <p:spPr>
           <a:xfrm>
             <a:off x="4392000" y="2009160"/>
-            <a:ext cx="1099800" cy="580680"/>
+            <a:ext cx="1099440" cy="580320"/>
           </a:xfrm>
           <a:prstGeom prst="roundRect">
             <a:avLst>
@@ -6755,8 +6756,8 @@
         </p:nvSpPr>
         <p:spPr>
           <a:xfrm flipH="1" rot="10800000">
-            <a:off x="2229840" y="722160"/>
-            <a:ext cx="1799640" cy="1359360"/>
+            <a:off x="2229840" y="722520"/>
+            <a:ext cx="1799280" cy="1359000"/>
           </a:xfrm>
           <a:custGeom>
             <a:avLst/>
@@ -6798,7 +6799,7 @@
         <p:spPr>
           <a:xfrm>
             <a:off x="3888000" y="3773520"/>
-            <a:ext cx="2013840" cy="544320"/>
+            <a:ext cx="2013480" cy="543960"/>
           </a:xfrm>
           <a:prstGeom prst="bracketPair">
             <a:avLst>
@@ -6824,7 +6825,7 @@
             <a:noAutofit/>
           </a:bodyPr>
           <a:p>
-            <a:pPr marL="457200" indent="-286560">
+            <a:pPr marL="457200" indent="-286200">
               <a:lnSpc>
                 <a:spcPct val="100000"/>
               </a:lnSpc>
@@ -6849,7 +6850,7 @@
             </a:endParaRPr>
           </a:p>
           <a:p>
-            <a:pPr marL="457200" indent="-286560">
+            <a:pPr marL="457200" indent="-286200">
               <a:lnSpc>
                 <a:spcPct val="100000"/>
               </a:lnSpc>
@@ -6883,8 +6884,8 @@
         </p:nvSpPr>
         <p:spPr>
           <a:xfrm rot="10800000">
-            <a:off x="4967640" y="984600"/>
-            <a:ext cx="360" cy="1024560"/>
+            <a:off x="4967640" y="984960"/>
+            <a:ext cx="360" cy="1024200"/>
           </a:xfrm>
           <a:custGeom>
             <a:avLst/>
@@ -6926,7 +6927,7 @@
         <p:spPr>
           <a:xfrm>
             <a:off x="4968000" y="2598840"/>
-            <a:ext cx="360" cy="1157760"/>
+            <a:ext cx="360" cy="1157400"/>
           </a:xfrm>
           <a:custGeom>
             <a:avLst/>
@@ -6998,7 +6999,7 @@
         <p:spPr>
           <a:xfrm>
             <a:off x="143280" y="1593360"/>
-            <a:ext cx="9411480" cy="1501920"/>
+            <a:ext cx="9411120" cy="1501560"/>
           </a:xfrm>
           <a:prstGeom prst="rect">
             <a:avLst/>
@@ -7052,7 +7053,7 @@
         <p:spPr>
           <a:xfrm>
             <a:off x="4033800" y="204840"/>
-            <a:ext cx="1995480" cy="845280"/>
+            <a:ext cx="1995120" cy="844920"/>
           </a:xfrm>
           <a:prstGeom prst="wave">
             <a:avLst>
@@ -7081,7 +7082,422 @@
             <a:noAutofit/>
           </a:bodyPr>
           <a:p>
-            <a:pPr marL="457200" indent="-286560">
+            <a:pPr marL="457200" indent="-286200">
+              <a:lnSpc>
+                <a:spcPct val="100000"/>
+              </a:lnSpc>
+              <a:buClr>
+                <a:srgbClr val="000000"/>
+              </a:buClr>
+              <a:buFont typeface="Arial"/>
+              <a:buChar char="❖"/>
+            </a:pPr>
+            <a:r>
+              <a:rPr b="0" lang="pt-BR" sz="1000" spc="-1" strike="noStrike">
+                <a:solidFill>
+                  <a:srgbClr val="000000"/>
+                </a:solidFill>
+                <a:latin typeface="Arial"/>
+                <a:ea typeface="Arial"/>
+              </a:rPr>
+              <a:t>Vender produtos</a:t>
+            </a:r>
+            <a:endParaRPr b="0" lang="pt-BR" sz="1000" spc="-1" strike="noStrike">
+              <a:latin typeface="Arial"/>
+            </a:endParaRPr>
+          </a:p>
+        </p:txBody>
+      </p:sp>
+      <p:sp>
+        <p:nvSpPr>
+          <p:cNvPr id="160" name="CustomShape 3"/>
+          <p:cNvSpPr/>
+          <p:nvPr/>
+        </p:nvSpPr>
+        <p:spPr>
+          <a:xfrm>
+            <a:off x="143280" y="3100680"/>
+            <a:ext cx="9411120" cy="1501560"/>
+          </a:xfrm>
+          <a:prstGeom prst="rect">
+            <a:avLst/>
+          </a:prstGeom>
+          <a:noFill/>
+          <a:ln w="9360">
+            <a:solidFill>
+              <a:srgbClr val="ff9900"/>
+            </a:solidFill>
+            <a:round/>
+          </a:ln>
+        </p:spPr>
+        <p:style>
+          <a:lnRef idx="0"/>
+          <a:fillRef idx="0"/>
+          <a:effectRef idx="0"/>
+          <a:fontRef idx="minor"/>
+        </p:style>
+        <p:txBody>
+          <a:bodyPr lIns="90000" rIns="90000" tIns="91440" bIns="91440">
+            <a:noAutofit/>
+          </a:bodyPr>
+          <a:p>
+            <a:pPr>
+              <a:lnSpc>
+                <a:spcPct val="100000"/>
+              </a:lnSpc>
+            </a:pPr>
+            <a:r>
+              <a:rPr b="0" lang="pt-BR" sz="1400" spc="-1" strike="noStrike">
+                <a:solidFill>
+                  <a:srgbClr val="000000"/>
+                </a:solidFill>
+                <a:latin typeface="Arial"/>
+                <a:ea typeface="Arial"/>
+              </a:rPr>
+              <a:t>Capacidades Operacionais</a:t>
+            </a:r>
+            <a:endParaRPr b="0" lang="pt-BR" sz="1400" spc="-1" strike="noStrike">
+              <a:latin typeface="Arial"/>
+            </a:endParaRPr>
+          </a:p>
+        </p:txBody>
+      </p:sp>
+      <p:sp>
+        <p:nvSpPr>
+          <p:cNvPr id="161" name="CustomShape 4"/>
+          <p:cNvSpPr/>
+          <p:nvPr/>
+        </p:nvSpPr>
+        <p:spPr>
+          <a:xfrm>
+            <a:off x="4392000" y="2009160"/>
+            <a:ext cx="1099440" cy="580320"/>
+          </a:xfrm>
+          <a:prstGeom prst="roundRect">
+            <a:avLst>
+              <a:gd name="adj" fmla="val 16667"/>
+            </a:avLst>
+          </a:prstGeom>
+          <a:gradFill rotWithShape="0">
+            <a:gsLst>
+              <a:gs pos="0">
+                <a:srgbClr val="d4e5f5"/>
+              </a:gs>
+              <a:gs pos="100000">
+                <a:srgbClr val="70a4d5"/>
+              </a:gs>
+            </a:gsLst>
+            <a:path path="circle">
+              <a:fillToRect l="50000" t="50000" r="50000" b="50000"/>
+            </a:path>
+          </a:gradFill>
+          <a:ln w="9360">
+            <a:solidFill>
+              <a:srgbClr val="f3f3f3"/>
+            </a:solidFill>
+            <a:round/>
+          </a:ln>
+        </p:spPr>
+        <p:style>
+          <a:lnRef idx="0"/>
+          <a:fillRef idx="0"/>
+          <a:effectRef idx="0"/>
+          <a:fontRef idx="minor"/>
+        </p:style>
+        <p:txBody>
+          <a:bodyPr lIns="90000" rIns="90000" tIns="91440" bIns="91440" anchor="ctr">
+            <a:noAutofit/>
+          </a:bodyPr>
+          <a:p>
+            <a:pPr algn="ctr">
+              <a:lnSpc>
+                <a:spcPct val="100000"/>
+              </a:lnSpc>
+            </a:pPr>
+            <a:r>
+              <a:rPr b="0" lang="pt-BR" sz="1000" spc="-1" strike="noStrike">
+                <a:solidFill>
+                  <a:srgbClr val="000000"/>
+                </a:solidFill>
+                <a:latin typeface="Arial"/>
+                <a:ea typeface="Arial"/>
+              </a:rPr>
+              <a:t>Cozinha</a:t>
+            </a:r>
+            <a:endParaRPr b="0" lang="pt-BR" sz="1000" spc="-1" strike="noStrike">
+              <a:latin typeface="Arial"/>
+            </a:endParaRPr>
+          </a:p>
+        </p:txBody>
+      </p:sp>
+      <p:sp>
+        <p:nvSpPr>
+          <p:cNvPr id="162" name="CustomShape 5"/>
+          <p:cNvSpPr/>
+          <p:nvPr/>
+        </p:nvSpPr>
+        <p:spPr>
+          <a:xfrm>
+            <a:off x="3888000" y="3773520"/>
+            <a:ext cx="2013480" cy="543960"/>
+          </a:xfrm>
+          <a:prstGeom prst="bracketPair">
+            <a:avLst>
+              <a:gd name="adj" fmla="val 16667"/>
+            </a:avLst>
+          </a:prstGeom>
+          <a:noFill/>
+          <a:ln w="9360">
+            <a:solidFill>
+              <a:srgbClr val="595959"/>
+            </a:solidFill>
+            <a:round/>
+          </a:ln>
+        </p:spPr>
+        <p:style>
+          <a:lnRef idx="0"/>
+          <a:fillRef idx="0"/>
+          <a:effectRef idx="0"/>
+          <a:fontRef idx="minor"/>
+        </p:style>
+        <p:txBody>
+          <a:bodyPr lIns="90000" rIns="90000" tIns="91440" bIns="91440" anchor="ctr">
+            <a:noAutofit/>
+          </a:bodyPr>
+          <a:p>
+            <a:pPr marL="457200" indent="-286200">
+              <a:lnSpc>
+                <a:spcPct val="100000"/>
+              </a:lnSpc>
+              <a:buClr>
+                <a:srgbClr val="000000"/>
+              </a:buClr>
+              <a:buFont typeface="Arial"/>
+              <a:buChar char="●"/>
+            </a:pPr>
+            <a:r>
+              <a:rPr b="0" lang="pt-BR" sz="1000" spc="-1" strike="noStrike">
+                <a:solidFill>
+                  <a:srgbClr val="000000"/>
+                </a:solidFill>
+                <a:latin typeface="Arial"/>
+                <a:ea typeface="Arial"/>
+              </a:rPr>
+              <a:t>Gerenciar produtos</a:t>
+            </a:r>
+            <a:endParaRPr b="0" lang="pt-BR" sz="1000" spc="-1" strike="noStrike">
+              <a:latin typeface="Arial"/>
+            </a:endParaRPr>
+          </a:p>
+        </p:txBody>
+      </p:sp>
+      <p:sp>
+        <p:nvSpPr>
+          <p:cNvPr id="163" name="CustomShape 6"/>
+          <p:cNvSpPr/>
+          <p:nvPr/>
+        </p:nvSpPr>
+        <p:spPr>
+          <a:xfrm rot="10800000">
+            <a:off x="4967640" y="984960"/>
+            <a:ext cx="360" cy="1024200"/>
+          </a:xfrm>
+          <a:custGeom>
+            <a:avLst/>
+            <a:gdLst/>
+            <a:ahLst/>
+            <a:rect l="l" t="t" r="r" b="b"/>
+            <a:pathLst>
+              <a:path w="21600" h="21600">
+                <a:moveTo>
+                  <a:pt x="0" y="0"/>
+                </a:moveTo>
+                <a:lnTo>
+                  <a:pt x="21600" y="21600"/>
+                </a:lnTo>
+              </a:path>
+            </a:pathLst>
+          </a:custGeom>
+          <a:noFill/>
+          <a:ln w="9360">
+            <a:solidFill>
+              <a:srgbClr val="3465a4"/>
+            </a:solidFill>
+            <a:round/>
+          </a:ln>
+        </p:spPr>
+        <p:style>
+          <a:lnRef idx="0"/>
+          <a:fillRef idx="0"/>
+          <a:effectRef idx="0"/>
+          <a:fontRef idx="minor"/>
+        </p:style>
+      </p:sp>
+      <p:sp>
+        <p:nvSpPr>
+          <p:cNvPr id="164" name="CustomShape 7"/>
+          <p:cNvSpPr/>
+          <p:nvPr/>
+        </p:nvSpPr>
+        <p:spPr>
+          <a:xfrm>
+            <a:off x="4968000" y="2598840"/>
+            <a:ext cx="360" cy="1157400"/>
+          </a:xfrm>
+          <a:custGeom>
+            <a:avLst/>
+            <a:gdLst/>
+            <a:ahLst/>
+            <a:rect l="l" t="t" r="r" b="b"/>
+            <a:pathLst>
+              <a:path w="21600" h="21600">
+                <a:moveTo>
+                  <a:pt x="0" y="0"/>
+                </a:moveTo>
+                <a:lnTo>
+                  <a:pt x="21600" y="21600"/>
+                </a:lnTo>
+              </a:path>
+            </a:pathLst>
+          </a:custGeom>
+          <a:noFill/>
+          <a:ln w="9360">
+            <a:solidFill>
+              <a:srgbClr val="3465a4"/>
+            </a:solidFill>
+            <a:round/>
+          </a:ln>
+        </p:spPr>
+        <p:style>
+          <a:lnRef idx="0"/>
+          <a:fillRef idx="0"/>
+          <a:effectRef idx="0"/>
+          <a:fontRef idx="minor"/>
+        </p:style>
+      </p:sp>
+    </p:spTree>
+  </p:cSld>
+  <mc:AlternateContent>
+    <mc:Choice Requires="p14">
+      <p:transition spd="slow" p14:dur="2000"/>
+    </mc:Choice>
+    <mc:Fallback>
+      <p:transition spd="slow"/>
+    </mc:Fallback>
+  </mc:AlternateContent>
+</p:sld>
+</file>
+
+<file path=ppt/slides/slide5.xml><?xml version="1.0" encoding="utf-8"?>
+<p:sld xmlns:a="http://schemas.openxmlformats.org/drawingml/2006/main" xmlns:p="http://schemas.openxmlformats.org/presentationml/2006/main" xmlns:r="http://schemas.openxmlformats.org/officeDocument/2006/relationships" xmlns:p14="http://schemas.microsoft.com/office/powerpoint/2010/main" xmlns:p15="http://schemas.microsoft.com/office/powerpoint/2012/main" xmlns:mc="http://schemas.openxmlformats.org/markup-compatibility/2006">
+  <p:cSld>
+    <p:spTree>
+      <p:nvGrpSpPr>
+        <p:cNvPr id="1" name=""/>
+        <p:cNvGrpSpPr/>
+        <p:nvPr/>
+      </p:nvGrpSpPr>
+      <p:grpSpPr>
+        <a:xfrm>
+          <a:off x="0" y="0"/>
+          <a:ext cx="0" cy="0"/>
+          <a:chOff x="0" y="0"/>
+          <a:chExt cx="0" cy="0"/>
+        </a:xfrm>
+      </p:grpSpPr>
+      <p:sp>
+        <p:nvSpPr>
+          <p:cNvPr id="165" name="CustomShape 1"/>
+          <p:cNvSpPr/>
+          <p:nvPr/>
+        </p:nvSpPr>
+        <p:spPr>
+          <a:xfrm>
+            <a:off x="143280" y="1593360"/>
+            <a:ext cx="9411120" cy="1501560"/>
+          </a:xfrm>
+          <a:prstGeom prst="rect">
+            <a:avLst/>
+          </a:prstGeom>
+          <a:noFill/>
+          <a:ln w="9360">
+            <a:solidFill>
+              <a:srgbClr val="ff9900"/>
+            </a:solidFill>
+            <a:round/>
+          </a:ln>
+        </p:spPr>
+        <p:style>
+          <a:lnRef idx="0"/>
+          <a:fillRef idx="0"/>
+          <a:effectRef idx="0"/>
+          <a:fontRef idx="minor"/>
+        </p:style>
+        <p:txBody>
+          <a:bodyPr lIns="90000" rIns="90000" tIns="91440" bIns="91440">
+            <a:noAutofit/>
+          </a:bodyPr>
+          <a:p>
+            <a:pPr>
+              <a:lnSpc>
+                <a:spcPct val="100000"/>
+              </a:lnSpc>
+            </a:pPr>
+            <a:r>
+              <a:rPr b="0" lang="pt-BR" sz="1400" spc="-1" strike="noStrike">
+                <a:solidFill>
+                  <a:srgbClr val="000000"/>
+                </a:solidFill>
+                <a:latin typeface="Arial"/>
+                <a:ea typeface="Arial"/>
+              </a:rPr>
+              <a:t>Nós Operacionais</a:t>
+            </a:r>
+            <a:endParaRPr b="0" lang="pt-BR" sz="1400" spc="-1" strike="noStrike">
+              <a:latin typeface="Arial"/>
+            </a:endParaRPr>
+          </a:p>
+        </p:txBody>
+      </p:sp>
+      <p:sp>
+        <p:nvSpPr>
+          <p:cNvPr id="166" name="CustomShape 2"/>
+          <p:cNvSpPr/>
+          <p:nvPr/>
+        </p:nvSpPr>
+        <p:spPr>
+          <a:xfrm>
+            <a:off x="4033800" y="204840"/>
+            <a:ext cx="1995120" cy="844920"/>
+          </a:xfrm>
+          <a:prstGeom prst="wave">
+            <a:avLst>
+              <a:gd name="adj1" fmla="val 6999"/>
+              <a:gd name="adj2" fmla="val 0"/>
+            </a:avLst>
+          </a:prstGeom>
+          <a:solidFill>
+            <a:srgbClr val="f4cccc"/>
+          </a:solidFill>
+          <a:ln w="9360">
+            <a:solidFill>
+              <a:srgbClr val="ffffff"/>
+            </a:solidFill>
+            <a:round/>
+          </a:ln>
+        </p:spPr>
+        <p:style>
+          <a:lnRef idx="0"/>
+          <a:fillRef idx="0"/>
+          <a:effectRef idx="0"/>
+          <a:fontRef idx="minor"/>
+        </p:style>
+        <p:txBody>
+          <a:bodyPr lIns="90000" rIns="90000" tIns="91440" bIns="91440" anchor="ctr">
+            <a:noAutofit/>
+          </a:bodyPr>
+          <a:p>
+            <a:pPr marL="457200" indent="-286200">
               <a:lnSpc>
                 <a:spcPct val="100000"/>
               </a:lnSpc>
@@ -7109,42 +7525,42 @@
       </p:sp>
       <p:grpSp>
         <p:nvGrpSpPr>
-          <p:cNvPr id="160" name="Group 3"/>
+          <p:cNvPr id="167" name="Group 3"/>
           <p:cNvGrpSpPr/>
           <p:nvPr/>
         </p:nvGrpSpPr>
         <p:grpSpPr>
           <a:xfrm>
             <a:off x="1637280" y="2081520"/>
-            <a:ext cx="1120320" cy="910440"/>
+            <a:ext cx="1119960" cy="910080"/>
             <a:chOff x="1637280" y="2081520"/>
-            <a:chExt cx="1120320" cy="910440"/>
+            <a:chExt cx="1119960" cy="910080"/>
           </a:xfrm>
         </p:grpSpPr>
         <p:grpSp>
           <p:nvGrpSpPr>
-            <p:cNvPr id="161" name="Group 4"/>
+            <p:cNvPr id="168" name="Group 4"/>
             <p:cNvGrpSpPr/>
             <p:nvPr/>
           </p:nvGrpSpPr>
           <p:grpSpPr>
             <a:xfrm>
-              <a:off x="2022120" y="2081520"/>
-              <a:ext cx="346320" cy="648000"/>
-              <a:chOff x="2022120" y="2081520"/>
-              <a:chExt cx="346320" cy="648000"/>
+              <a:off x="2021760" y="2081520"/>
+              <a:ext cx="346680" cy="648000"/>
+              <a:chOff x="2021760" y="2081520"/>
+              <a:chExt cx="346680" cy="648000"/>
             </a:xfrm>
           </p:grpSpPr>
           <p:sp>
             <p:nvSpPr>
-              <p:cNvPr id="162" name="CustomShape 5"/>
+              <p:cNvPr id="169" name="CustomShape 5"/>
               <p:cNvSpPr/>
               <p:nvPr/>
             </p:nvSpPr>
             <p:spPr>
               <a:xfrm>
                 <a:off x="2094840" y="2081520"/>
-                <a:ext cx="208800" cy="210960"/>
+                <a:ext cx="208440" cy="210600"/>
               </a:xfrm>
               <a:prstGeom prst="flowChartConnector">
                 <a:avLst/>
@@ -7168,14 +7584,14 @@
           </p:sp>
           <p:sp>
             <p:nvSpPr>
-              <p:cNvPr id="163" name="CustomShape 6"/>
+              <p:cNvPr id="170" name="CustomShape 6"/>
               <p:cNvSpPr/>
               <p:nvPr/>
             </p:nvSpPr>
             <p:spPr>
               <a:xfrm flipH="1">
-                <a:off x="2190600" y="2297880"/>
-                <a:ext cx="360" cy="219600"/>
+                <a:off x="2189880" y="2297880"/>
+                <a:ext cx="360" cy="219240"/>
               </a:xfrm>
               <a:custGeom>
                 <a:avLst/>
@@ -7210,14 +7626,14 @@
           </p:sp>
           <p:sp>
             <p:nvSpPr>
-              <p:cNvPr id="164" name="CustomShape 7"/>
+              <p:cNvPr id="171" name="CustomShape 7"/>
               <p:cNvSpPr/>
               <p:nvPr/>
             </p:nvSpPr>
             <p:spPr>
               <a:xfrm>
                 <a:off x="2046960" y="2395080"/>
-                <a:ext cx="304920" cy="360"/>
+                <a:ext cx="304560" cy="360"/>
               </a:xfrm>
               <a:custGeom>
                 <a:avLst/>
@@ -7252,14 +7668,14 @@
           </p:sp>
           <p:sp>
             <p:nvSpPr>
-              <p:cNvPr id="165" name="CustomShape 8"/>
+              <p:cNvPr id="172" name="CustomShape 8"/>
               <p:cNvSpPr/>
               <p:nvPr/>
             </p:nvSpPr>
             <p:spPr>
               <a:xfrm flipH="1">
                 <a:off x="2021760" y="2521440"/>
-                <a:ext cx="164520" cy="202680"/>
+                <a:ext cx="164160" cy="202320"/>
               </a:xfrm>
               <a:custGeom>
                 <a:avLst/>
@@ -7294,14 +7710,14 @@
           </p:sp>
           <p:sp>
             <p:nvSpPr>
-              <p:cNvPr id="166" name="CustomShape 9"/>
+              <p:cNvPr id="173" name="CustomShape 9"/>
               <p:cNvSpPr/>
               <p:nvPr/>
             </p:nvSpPr>
             <p:spPr>
               <a:xfrm rot="10800000">
-                <a:off x="2203560" y="2526840"/>
-                <a:ext cx="164880" cy="202680"/>
+                <a:off x="2203920" y="2527200"/>
+                <a:ext cx="164520" cy="202320"/>
               </a:xfrm>
               <a:custGeom>
                 <a:avLst/>
@@ -7337,14 +7753,14 @@
         </p:grpSp>
         <p:sp>
           <p:nvSpPr>
-            <p:cNvPr id="167" name="CustomShape 10"/>
+            <p:cNvPr id="174" name="CustomShape 10"/>
             <p:cNvSpPr/>
             <p:nvPr/>
           </p:nvSpPr>
           <p:spPr>
             <a:xfrm>
               <a:off x="1637280" y="2619360"/>
-              <a:ext cx="1120320" cy="372600"/>
+              <a:ext cx="1119960" cy="372240"/>
             </a:xfrm>
             <a:prstGeom prst="rect">
               <a:avLst/>
@@ -7389,14 +7805,14 @@
       </p:grpSp>
       <p:sp>
         <p:nvSpPr>
-          <p:cNvPr id="168" name="CustomShape 11"/>
+          <p:cNvPr id="175" name="CustomShape 11"/>
           <p:cNvSpPr/>
           <p:nvPr/>
         </p:nvSpPr>
         <p:spPr>
           <a:xfrm>
             <a:off x="143280" y="3100680"/>
-            <a:ext cx="9411480" cy="1501920"/>
+            <a:ext cx="9411120" cy="1501560"/>
           </a:xfrm>
           <a:prstGeom prst="rect">
             <a:avLst/>
@@ -7443,14 +7859,14 @@
       </p:sp>
       <p:sp>
         <p:nvSpPr>
-          <p:cNvPr id="169" name="CustomShape 12"/>
+          <p:cNvPr id="176" name="CustomShape 12"/>
           <p:cNvSpPr/>
           <p:nvPr/>
         </p:nvSpPr>
         <p:spPr>
           <a:xfrm>
             <a:off x="3826800" y="3456000"/>
-            <a:ext cx="2579040" cy="845640"/>
+            <a:ext cx="2578680" cy="845280"/>
           </a:xfrm>
           <a:prstGeom prst="bracketPair">
             <a:avLst>
@@ -7476,7 +7892,7 @@
             <a:noAutofit/>
           </a:bodyPr>
           <a:p>
-            <a:pPr marL="457200" indent="-289800">
+            <a:pPr marL="457200" indent="-289440">
               <a:lnSpc>
                 <a:spcPct val="100000"/>
               </a:lnSpc>
@@ -7501,7 +7917,7 @@
             </a:endParaRPr>
           </a:p>
           <a:p>
-            <a:pPr marL="457200" indent="-286560">
+            <a:pPr marL="457200" indent="-286200">
               <a:lnSpc>
                 <a:spcPct val="100000"/>
               </a:lnSpc>
@@ -7529,14 +7945,14 @@
       </p:sp>
       <p:sp>
         <p:nvSpPr>
-          <p:cNvPr id="170" name="CustomShape 13"/>
+          <p:cNvPr id="177" name="CustomShape 13"/>
           <p:cNvSpPr/>
           <p:nvPr/>
         </p:nvSpPr>
         <p:spPr>
           <a:xfrm>
             <a:off x="4442040" y="2009160"/>
-            <a:ext cx="1099800" cy="580680"/>
+            <a:ext cx="1099440" cy="580320"/>
           </a:xfrm>
           <a:prstGeom prst="roundRect">
             <a:avLst>
@@ -7597,14 +8013,14 @@
       </p:sp>
       <p:sp>
         <p:nvSpPr>
-          <p:cNvPr id="171" name="CustomShape 14"/>
+          <p:cNvPr id="178" name="CustomShape 14"/>
           <p:cNvSpPr/>
           <p:nvPr/>
         </p:nvSpPr>
         <p:spPr>
           <a:xfrm rot="16200000">
-            <a:off x="2369520" y="781200"/>
-            <a:ext cx="1812600" cy="1511640"/>
+            <a:off x="2369520" y="781560"/>
+            <a:ext cx="1812240" cy="1511280"/>
           </a:xfrm>
           <a:prstGeom prst="curvedConnector2">
             <a:avLst/>
@@ -7626,14 +8042,14 @@
       </p:sp>
       <p:sp>
         <p:nvSpPr>
-          <p:cNvPr id="172" name="CustomShape 15"/>
+          <p:cNvPr id="179" name="CustomShape 15"/>
           <p:cNvSpPr/>
           <p:nvPr/>
         </p:nvSpPr>
         <p:spPr>
           <a:xfrm rot="10800000">
-            <a:off x="5033160" y="1010160"/>
-            <a:ext cx="6120" cy="1010880"/>
+            <a:off x="5033520" y="1010520"/>
+            <a:ext cx="5760" cy="1010520"/>
           </a:xfrm>
           <a:custGeom>
             <a:avLst/>
@@ -7668,14 +8084,14 @@
       </p:sp>
       <p:sp>
         <p:nvSpPr>
-          <p:cNvPr id="173" name="CustomShape 16"/>
+          <p:cNvPr id="180" name="CustomShape 16"/>
           <p:cNvSpPr/>
           <p:nvPr/>
         </p:nvSpPr>
         <p:spPr>
           <a:xfrm flipH="1" rot="10800000">
-            <a:off x="5035680" y="2594160"/>
-            <a:ext cx="360" cy="789840"/>
+            <a:off x="5034960" y="2594520"/>
+            <a:ext cx="360" cy="789480"/>
           </a:xfrm>
           <a:custGeom>
             <a:avLst/>
@@ -7710,42 +8126,42 @@
       </p:sp>
       <p:grpSp>
         <p:nvGrpSpPr>
-          <p:cNvPr id="174" name="Group 17"/>
+          <p:cNvPr id="181" name="Group 17"/>
           <p:cNvGrpSpPr/>
           <p:nvPr/>
         </p:nvGrpSpPr>
         <p:grpSpPr>
           <a:xfrm>
             <a:off x="6840720" y="2009160"/>
-            <a:ext cx="1120320" cy="910440"/>
+            <a:ext cx="1119960" cy="910080"/>
             <a:chOff x="6840720" y="2009160"/>
-            <a:chExt cx="1120320" cy="910440"/>
+            <a:chExt cx="1119960" cy="910080"/>
           </a:xfrm>
         </p:grpSpPr>
         <p:grpSp>
           <p:nvGrpSpPr>
-            <p:cNvPr id="175" name="Group 18"/>
+            <p:cNvPr id="182" name="Group 18"/>
             <p:cNvGrpSpPr/>
             <p:nvPr/>
           </p:nvGrpSpPr>
           <p:grpSpPr>
             <a:xfrm>
-              <a:off x="7225560" y="2009160"/>
-              <a:ext cx="346320" cy="648000"/>
-              <a:chOff x="7225560" y="2009160"/>
-              <a:chExt cx="346320" cy="648000"/>
+              <a:off x="7225200" y="2009160"/>
+              <a:ext cx="346680" cy="648000"/>
+              <a:chOff x="7225200" y="2009160"/>
+              <a:chExt cx="346680" cy="648000"/>
             </a:xfrm>
           </p:grpSpPr>
           <p:sp>
             <p:nvSpPr>
-              <p:cNvPr id="176" name="CustomShape 19"/>
+              <p:cNvPr id="183" name="CustomShape 19"/>
               <p:cNvSpPr/>
               <p:nvPr/>
             </p:nvSpPr>
             <p:spPr>
               <a:xfrm>
                 <a:off x="7298280" y="2009160"/>
-                <a:ext cx="208800" cy="210960"/>
+                <a:ext cx="208440" cy="210600"/>
               </a:xfrm>
               <a:prstGeom prst="flowChartConnector">
                 <a:avLst/>
@@ -7769,14 +8185,14 @@
           </p:sp>
           <p:sp>
             <p:nvSpPr>
-              <p:cNvPr id="177" name="CustomShape 20"/>
+              <p:cNvPr id="184" name="CustomShape 20"/>
               <p:cNvSpPr/>
               <p:nvPr/>
             </p:nvSpPr>
             <p:spPr>
               <a:xfrm flipH="1">
-                <a:off x="7394040" y="2225520"/>
-                <a:ext cx="360" cy="219600"/>
+                <a:off x="7393320" y="2225520"/>
+                <a:ext cx="360" cy="219240"/>
               </a:xfrm>
               <a:custGeom>
                 <a:avLst/>
@@ -7811,14 +8227,14 @@
           </p:sp>
           <p:sp>
             <p:nvSpPr>
-              <p:cNvPr id="178" name="CustomShape 21"/>
+              <p:cNvPr id="185" name="CustomShape 21"/>
               <p:cNvSpPr/>
               <p:nvPr/>
             </p:nvSpPr>
             <p:spPr>
               <a:xfrm>
                 <a:off x="7250400" y="2322720"/>
-                <a:ext cx="304920" cy="360"/>
+                <a:ext cx="304560" cy="360"/>
               </a:xfrm>
               <a:custGeom>
                 <a:avLst/>
@@ -7853,14 +8269,14 @@
           </p:sp>
           <p:sp>
             <p:nvSpPr>
-              <p:cNvPr id="179" name="CustomShape 22"/>
+              <p:cNvPr id="186" name="CustomShape 22"/>
               <p:cNvSpPr/>
               <p:nvPr/>
             </p:nvSpPr>
             <p:spPr>
               <a:xfrm flipH="1">
                 <a:off x="7225200" y="2449080"/>
-                <a:ext cx="164520" cy="202680"/>
+                <a:ext cx="164160" cy="202320"/>
               </a:xfrm>
               <a:custGeom>
                 <a:avLst/>
@@ -7895,14 +8311,14 @@
           </p:sp>
           <p:sp>
             <p:nvSpPr>
-              <p:cNvPr id="180" name="CustomShape 23"/>
+              <p:cNvPr id="187" name="CustomShape 23"/>
               <p:cNvSpPr/>
               <p:nvPr/>
             </p:nvSpPr>
             <p:spPr>
               <a:xfrm rot="10800000">
-                <a:off x="7407000" y="2454480"/>
-                <a:ext cx="164880" cy="202680"/>
+                <a:off x="7407360" y="2454840"/>
+                <a:ext cx="164520" cy="202320"/>
               </a:xfrm>
               <a:custGeom>
                 <a:avLst/>
@@ -7938,14 +8354,14 @@
         </p:grpSp>
         <p:sp>
           <p:nvSpPr>
-            <p:cNvPr id="181" name="CustomShape 24"/>
+            <p:cNvPr id="188" name="CustomShape 24"/>
             <p:cNvSpPr/>
             <p:nvPr/>
           </p:nvSpPr>
           <p:spPr>
             <a:xfrm>
               <a:off x="6840720" y="2547000"/>
-              <a:ext cx="1120320" cy="372600"/>
+              <a:ext cx="1119960" cy="372240"/>
             </a:xfrm>
             <a:prstGeom prst="rect">
               <a:avLst/>
@@ -7990,14 +8406,14 @@
       </p:grpSp>
       <p:sp>
         <p:nvSpPr>
-          <p:cNvPr id="182" name="CustomShape 25"/>
+          <p:cNvPr id="189" name="CustomShape 25"/>
           <p:cNvSpPr/>
           <p:nvPr/>
         </p:nvSpPr>
         <p:spPr>
           <a:xfrm>
             <a:off x="6031080" y="628560"/>
-            <a:ext cx="1370880" cy="1379160"/>
+            <a:ext cx="1370520" cy="1378800"/>
           </a:xfrm>
           <a:prstGeom prst="curvedConnector2">
             <a:avLst/>

</xml_diff>